<commit_message>
More updates to progress report
</commit_message>
<xml_diff>
--- a/Progress 8 Dec 2015/6 - Screens.pptx
+++ b/Progress 8 Dec 2015/6 - Screens.pptx
@@ -5,13 +5,20 @@
     <p:sldMasterId id="2147483648" r:id="rId1"/>
   </p:sldMasterIdLst>
   <p:sldIdLst>
-    <p:sldId id="256" r:id="rId2"/>
-    <p:sldId id="257" r:id="rId3"/>
+    <p:sldId id="257" r:id="rId2"/>
+    <p:sldId id="256" r:id="rId3"/>
     <p:sldId id="258" r:id="rId4"/>
-    <p:sldId id="259" r:id="rId5"/>
-    <p:sldId id="260" r:id="rId6"/>
+    <p:sldId id="260" r:id="rId5"/>
+    <p:sldId id="259" r:id="rId6"/>
     <p:sldId id="261" r:id="rId7"/>
     <p:sldId id="262" r:id="rId8"/>
+    <p:sldId id="263" r:id="rId9"/>
+    <p:sldId id="264" r:id="rId10"/>
+    <p:sldId id="265" r:id="rId11"/>
+    <p:sldId id="266" r:id="rId12"/>
+    <p:sldId id="267" r:id="rId13"/>
+    <p:sldId id="268" r:id="rId14"/>
+    <p:sldId id="269" r:id="rId15"/>
   </p:sldIdLst>
   <p:sldSz cx="12192000" cy="6858000"/>
   <p:notesSz cx="6858000" cy="9144000"/>
@@ -249,7 +256,7 @@
           <a:p>
             <a:fld id="{39FA8686-1192-49F3-B198-FCAB04A5C4EA}" type="datetimeFigureOut">
               <a:rPr lang="en-US" smtClean="0"/>
-              <a:t>11/18/2015</a:t>
+              <a:t>12/8/2015</a:t>
             </a:fld>
             <a:endParaRPr lang="en-US"/>
           </a:p>
@@ -419,7 +426,7 @@
           <a:p>
             <a:fld id="{39FA8686-1192-49F3-B198-FCAB04A5C4EA}" type="datetimeFigureOut">
               <a:rPr lang="en-US" smtClean="0"/>
-              <a:t>11/18/2015</a:t>
+              <a:t>12/8/2015</a:t>
             </a:fld>
             <a:endParaRPr lang="en-US"/>
           </a:p>
@@ -599,7 +606,7 @@
           <a:p>
             <a:fld id="{39FA8686-1192-49F3-B198-FCAB04A5C4EA}" type="datetimeFigureOut">
               <a:rPr lang="en-US" smtClean="0"/>
-              <a:t>11/18/2015</a:t>
+              <a:t>12/8/2015</a:t>
             </a:fld>
             <a:endParaRPr lang="en-US"/>
           </a:p>
@@ -769,7 +776,7 @@
           <a:p>
             <a:fld id="{39FA8686-1192-49F3-B198-FCAB04A5C4EA}" type="datetimeFigureOut">
               <a:rPr lang="en-US" smtClean="0"/>
-              <a:t>11/18/2015</a:t>
+              <a:t>12/8/2015</a:t>
             </a:fld>
             <a:endParaRPr lang="en-US"/>
           </a:p>
@@ -1015,7 +1022,7 @@
           <a:p>
             <a:fld id="{39FA8686-1192-49F3-B198-FCAB04A5C4EA}" type="datetimeFigureOut">
               <a:rPr lang="en-US" smtClean="0"/>
-              <a:t>11/18/2015</a:t>
+              <a:t>12/8/2015</a:t>
             </a:fld>
             <a:endParaRPr lang="en-US"/>
           </a:p>
@@ -1247,7 +1254,7 @@
           <a:p>
             <a:fld id="{39FA8686-1192-49F3-B198-FCAB04A5C4EA}" type="datetimeFigureOut">
               <a:rPr lang="en-US" smtClean="0"/>
-              <a:t>11/18/2015</a:t>
+              <a:t>12/8/2015</a:t>
             </a:fld>
             <a:endParaRPr lang="en-US"/>
           </a:p>
@@ -1614,7 +1621,7 @@
           <a:p>
             <a:fld id="{39FA8686-1192-49F3-B198-FCAB04A5C4EA}" type="datetimeFigureOut">
               <a:rPr lang="en-US" smtClean="0"/>
-              <a:t>11/18/2015</a:t>
+              <a:t>12/8/2015</a:t>
             </a:fld>
             <a:endParaRPr lang="en-US"/>
           </a:p>
@@ -1732,7 +1739,7 @@
           <a:p>
             <a:fld id="{39FA8686-1192-49F3-B198-FCAB04A5C4EA}" type="datetimeFigureOut">
               <a:rPr lang="en-US" smtClean="0"/>
-              <a:t>11/18/2015</a:t>
+              <a:t>12/8/2015</a:t>
             </a:fld>
             <a:endParaRPr lang="en-US"/>
           </a:p>
@@ -1827,7 +1834,7 @@
           <a:p>
             <a:fld id="{39FA8686-1192-49F3-B198-FCAB04A5C4EA}" type="datetimeFigureOut">
               <a:rPr lang="en-US" smtClean="0"/>
-              <a:t>11/18/2015</a:t>
+              <a:t>12/8/2015</a:t>
             </a:fld>
             <a:endParaRPr lang="en-US"/>
           </a:p>
@@ -2104,7 +2111,7 @@
           <a:p>
             <a:fld id="{39FA8686-1192-49F3-B198-FCAB04A5C4EA}" type="datetimeFigureOut">
               <a:rPr lang="en-US" smtClean="0"/>
-              <a:t>11/18/2015</a:t>
+              <a:t>12/8/2015</a:t>
             </a:fld>
             <a:endParaRPr lang="en-US"/>
           </a:p>
@@ -2357,7 +2364,7 @@
           <a:p>
             <a:fld id="{39FA8686-1192-49F3-B198-FCAB04A5C4EA}" type="datetimeFigureOut">
               <a:rPr lang="en-US" smtClean="0"/>
-              <a:t>11/18/2015</a:t>
+              <a:t>12/8/2015</a:t>
             </a:fld>
             <a:endParaRPr lang="en-US"/>
           </a:p>
@@ -2570,7 +2577,7 @@
           <a:p>
             <a:fld id="{39FA8686-1192-49F3-B198-FCAB04A5C4EA}" type="datetimeFigureOut">
               <a:rPr lang="en-US" smtClean="0"/>
-              <a:t>11/18/2015</a:t>
+              <a:t>12/8/2015</a:t>
             </a:fld>
             <a:endParaRPr lang="en-US"/>
           </a:p>
@@ -2977,7 +2984,7 @@
       </p:grpSpPr>
       <p:pic>
         <p:nvPicPr>
-          <p:cNvPr id="2" name="Picture 1"/>
+          <p:cNvPr id="3" name="Picture 2"/>
           <p:cNvPicPr>
             <a:picLocks noChangeAspect="1"/>
           </p:cNvPicPr>
@@ -2985,13 +2992,13 @@
         </p:nvPicPr>
         <p:blipFill rotWithShape="1">
           <a:blip r:embed="rId2"/>
-          <a:srcRect t="11347" r="17058" b="5710"/>
+          <a:srcRect t="11260" r="136" b="5605"/>
           <a:stretch/>
         </p:blipFill>
         <p:spPr>
           <a:xfrm>
-            <a:off x="0" y="0"/>
-            <a:ext cx="12192000" cy="6854653"/>
+            <a:off x="464457" y="1103087"/>
+            <a:ext cx="11132822" cy="5210628"/>
           </a:xfrm>
           <a:prstGeom prst="rect">
             <a:avLst/>
@@ -3001,7 +3008,272 @@
     </p:spTree>
     <p:extLst>
       <p:ext uri="{BB962C8B-B14F-4D97-AF65-F5344CB8AC3E}">
-        <p14:creationId xmlns:p14="http://schemas.microsoft.com/office/powerpoint/2010/main" val="2590118571"/>
+        <p14:creationId xmlns:p14="http://schemas.microsoft.com/office/powerpoint/2010/main" val="1048569049"/>
+      </p:ext>
+    </p:extLst>
+  </p:cSld>
+  <p:clrMapOvr>
+    <a:masterClrMapping/>
+  </p:clrMapOvr>
+</p:sld>
+</file>
+
+<file path=ppt/slides/slide10.xml><?xml version="1.0" encoding="utf-8"?>
+<p:sld xmlns:a="http://schemas.openxmlformats.org/drawingml/2006/main" xmlns:r="http://schemas.openxmlformats.org/officeDocument/2006/relationships" xmlns:p="http://schemas.openxmlformats.org/presentationml/2006/main">
+  <p:cSld>
+    <p:spTree>
+      <p:nvGrpSpPr>
+        <p:cNvPr id="1" name=""/>
+        <p:cNvGrpSpPr/>
+        <p:nvPr/>
+      </p:nvGrpSpPr>
+      <p:grpSpPr>
+        <a:xfrm>
+          <a:off x="0" y="0"/>
+          <a:ext cx="0" cy="0"/>
+          <a:chOff x="0" y="0"/>
+          <a:chExt cx="0" cy="0"/>
+        </a:xfrm>
+      </p:grpSpPr>
+      <p:pic>
+        <p:nvPicPr>
+          <p:cNvPr id="2" name="Picture 1"/>
+          <p:cNvPicPr>
+            <a:picLocks noChangeAspect="1"/>
+          </p:cNvPicPr>
+          <p:nvPr/>
+        </p:nvPicPr>
+        <p:blipFill rotWithShape="1">
+          <a:blip r:embed="rId2"/>
+          <a:srcRect l="1" t="11459" r="1363" b="6002"/>
+          <a:stretch/>
+        </p:blipFill>
+        <p:spPr>
+          <a:xfrm>
+            <a:off x="432254" y="696687"/>
+            <a:ext cx="11585576" cy="5450686"/>
+          </a:xfrm>
+          <a:prstGeom prst="rect">
+            <a:avLst/>
+          </a:prstGeom>
+        </p:spPr>
+      </p:pic>
+    </p:spTree>
+    <p:extLst>
+      <p:ext uri="{BB962C8B-B14F-4D97-AF65-F5344CB8AC3E}">
+        <p14:creationId xmlns:p14="http://schemas.microsoft.com/office/powerpoint/2010/main" val="3973549691"/>
+      </p:ext>
+    </p:extLst>
+  </p:cSld>
+  <p:clrMapOvr>
+    <a:masterClrMapping/>
+  </p:clrMapOvr>
+</p:sld>
+</file>
+
+<file path=ppt/slides/slide11.xml><?xml version="1.0" encoding="utf-8"?>
+<p:sld xmlns:a="http://schemas.openxmlformats.org/drawingml/2006/main" xmlns:r="http://schemas.openxmlformats.org/officeDocument/2006/relationships" xmlns:p="http://schemas.openxmlformats.org/presentationml/2006/main">
+  <p:cSld>
+    <p:spTree>
+      <p:nvGrpSpPr>
+        <p:cNvPr id="1" name=""/>
+        <p:cNvGrpSpPr/>
+        <p:nvPr/>
+      </p:nvGrpSpPr>
+      <p:grpSpPr>
+        <a:xfrm>
+          <a:off x="0" y="0"/>
+          <a:ext cx="0" cy="0"/>
+          <a:chOff x="0" y="0"/>
+          <a:chExt cx="0" cy="0"/>
+        </a:xfrm>
+      </p:grpSpPr>
+      <p:pic>
+        <p:nvPicPr>
+          <p:cNvPr id="2" name="Picture 1"/>
+          <p:cNvPicPr>
+            <a:picLocks noChangeAspect="1"/>
+          </p:cNvPicPr>
+          <p:nvPr/>
+        </p:nvPicPr>
+        <p:blipFill rotWithShape="1">
+          <a:blip r:embed="rId2"/>
+          <a:srcRect t="11657" r="1587" b="6200"/>
+          <a:stretch/>
+        </p:blipFill>
+        <p:spPr>
+          <a:xfrm>
+            <a:off x="403225" y="885371"/>
+            <a:ext cx="11048546" cy="5184767"/>
+          </a:xfrm>
+          <a:prstGeom prst="rect">
+            <a:avLst/>
+          </a:prstGeom>
+        </p:spPr>
+      </p:pic>
+    </p:spTree>
+    <p:extLst>
+      <p:ext uri="{BB962C8B-B14F-4D97-AF65-F5344CB8AC3E}">
+        <p14:creationId xmlns:p14="http://schemas.microsoft.com/office/powerpoint/2010/main" val="3531761722"/>
+      </p:ext>
+    </p:extLst>
+  </p:cSld>
+  <p:clrMapOvr>
+    <a:masterClrMapping/>
+  </p:clrMapOvr>
+</p:sld>
+</file>
+
+<file path=ppt/slides/slide12.xml><?xml version="1.0" encoding="utf-8"?>
+<p:sld xmlns:a="http://schemas.openxmlformats.org/drawingml/2006/main" xmlns:r="http://schemas.openxmlformats.org/officeDocument/2006/relationships" xmlns:p="http://schemas.openxmlformats.org/presentationml/2006/main">
+  <p:cSld>
+    <p:spTree>
+      <p:nvGrpSpPr>
+        <p:cNvPr id="1" name=""/>
+        <p:cNvGrpSpPr/>
+        <p:nvPr/>
+      </p:nvGrpSpPr>
+      <p:grpSpPr>
+        <a:xfrm>
+          <a:off x="0" y="0"/>
+          <a:ext cx="0" cy="0"/>
+          <a:chOff x="0" y="0"/>
+          <a:chExt cx="0" cy="0"/>
+        </a:xfrm>
+      </p:grpSpPr>
+      <p:pic>
+        <p:nvPicPr>
+          <p:cNvPr id="4" name="Picture 3"/>
+          <p:cNvPicPr>
+            <a:picLocks noChangeAspect="1"/>
+          </p:cNvPicPr>
+          <p:nvPr/>
+        </p:nvPicPr>
+        <p:blipFill rotWithShape="1">
+          <a:blip r:embed="rId2"/>
+          <a:srcRect l="1" t="11062" r="1921" b="6200"/>
+          <a:stretch/>
+        </p:blipFill>
+        <p:spPr>
+          <a:xfrm>
+            <a:off x="272596" y="478972"/>
+            <a:ext cx="11720746" cy="5558972"/>
+          </a:xfrm>
+          <a:prstGeom prst="rect">
+            <a:avLst/>
+          </a:prstGeom>
+        </p:spPr>
+      </p:pic>
+    </p:spTree>
+    <p:extLst>
+      <p:ext uri="{BB962C8B-B14F-4D97-AF65-F5344CB8AC3E}">
+        <p14:creationId xmlns:p14="http://schemas.microsoft.com/office/powerpoint/2010/main" val="3030065313"/>
+      </p:ext>
+    </p:extLst>
+  </p:cSld>
+  <p:clrMapOvr>
+    <a:masterClrMapping/>
+  </p:clrMapOvr>
+</p:sld>
+</file>
+
+<file path=ppt/slides/slide13.xml><?xml version="1.0" encoding="utf-8"?>
+<p:sld xmlns:a="http://schemas.openxmlformats.org/drawingml/2006/main" xmlns:r="http://schemas.openxmlformats.org/officeDocument/2006/relationships" xmlns:p="http://schemas.openxmlformats.org/presentationml/2006/main">
+  <p:cSld>
+    <p:spTree>
+      <p:nvGrpSpPr>
+        <p:cNvPr id="1" name=""/>
+        <p:cNvGrpSpPr/>
+        <p:nvPr/>
+      </p:nvGrpSpPr>
+      <p:grpSpPr>
+        <a:xfrm>
+          <a:off x="0" y="0"/>
+          <a:ext cx="0" cy="0"/>
+          <a:chOff x="0" y="0"/>
+          <a:chExt cx="0" cy="0"/>
+        </a:xfrm>
+      </p:grpSpPr>
+      <p:pic>
+        <p:nvPicPr>
+          <p:cNvPr id="2" name="Picture 1"/>
+          <p:cNvPicPr>
+            <a:picLocks noChangeAspect="1"/>
+          </p:cNvPicPr>
+          <p:nvPr/>
+        </p:nvPicPr>
+        <p:blipFill rotWithShape="1">
+          <a:blip r:embed="rId2"/>
+          <a:srcRect t="11561" r="1586" b="6001"/>
+          <a:stretch/>
+        </p:blipFill>
+        <p:spPr>
+          <a:xfrm>
+            <a:off x="867683" y="856343"/>
+            <a:ext cx="10910036" cy="5138057"/>
+          </a:xfrm>
+          <a:prstGeom prst="rect">
+            <a:avLst/>
+          </a:prstGeom>
+        </p:spPr>
+      </p:pic>
+    </p:spTree>
+    <p:extLst>
+      <p:ext uri="{BB962C8B-B14F-4D97-AF65-F5344CB8AC3E}">
+        <p14:creationId xmlns:p14="http://schemas.microsoft.com/office/powerpoint/2010/main" val="2129766229"/>
+      </p:ext>
+    </p:extLst>
+  </p:cSld>
+  <p:clrMapOvr>
+    <a:masterClrMapping/>
+  </p:clrMapOvr>
+</p:sld>
+</file>
+
+<file path=ppt/slides/slide14.xml><?xml version="1.0" encoding="utf-8"?>
+<p:sld xmlns:a="http://schemas.openxmlformats.org/drawingml/2006/main" xmlns:r="http://schemas.openxmlformats.org/officeDocument/2006/relationships" xmlns:p="http://schemas.openxmlformats.org/presentationml/2006/main">
+  <p:cSld>
+    <p:spTree>
+      <p:nvGrpSpPr>
+        <p:cNvPr id="1" name=""/>
+        <p:cNvGrpSpPr/>
+        <p:nvPr/>
+      </p:nvGrpSpPr>
+      <p:grpSpPr>
+        <a:xfrm>
+          <a:off x="0" y="0"/>
+          <a:ext cx="0" cy="0"/>
+          <a:chOff x="0" y="0"/>
+          <a:chExt cx="0" cy="0"/>
+        </a:xfrm>
+      </p:grpSpPr>
+      <p:pic>
+        <p:nvPicPr>
+          <p:cNvPr id="2" name="Picture 1"/>
+          <p:cNvPicPr>
+            <a:picLocks noChangeAspect="1"/>
+          </p:cNvPicPr>
+          <p:nvPr/>
+        </p:nvPicPr>
+        <p:blipFill rotWithShape="1">
+          <a:blip r:embed="rId2"/>
+          <a:srcRect t="11724" r="2689" b="5804"/>
+          <a:stretch/>
+        </p:blipFill>
+        <p:spPr>
+          <a:xfrm>
+            <a:off x="562882" y="725714"/>
+            <a:ext cx="10874375" cy="5181600"/>
+          </a:xfrm>
+          <a:prstGeom prst="rect">
+            <a:avLst/>
+          </a:prstGeom>
+        </p:spPr>
+      </p:pic>
+    </p:spTree>
+    <p:extLst>
+      <p:ext uri="{BB962C8B-B14F-4D97-AF65-F5344CB8AC3E}">
+        <p14:creationId xmlns:p14="http://schemas.microsoft.com/office/powerpoint/2010/main" val="3131581354"/>
       </p:ext>
     </p:extLst>
   </p:cSld>
@@ -3030,7 +3302,7 @@
       </p:grpSpPr>
       <p:pic>
         <p:nvPicPr>
-          <p:cNvPr id="4" name="Picture 3"/>
+          <p:cNvPr id="3" name="Picture 2"/>
           <p:cNvPicPr>
             <a:picLocks noChangeAspect="1"/>
           </p:cNvPicPr>
@@ -3038,13 +3310,13 @@
         </p:nvPicPr>
         <p:blipFill rotWithShape="1">
           <a:blip r:embed="rId2"/>
-          <a:srcRect t="10908" r="16472" b="5564"/>
+          <a:srcRect t="11508" r="48" b="5358"/>
           <a:stretch/>
         </p:blipFill>
         <p:spPr>
           <a:xfrm>
-            <a:off x="0" y="0"/>
-            <a:ext cx="12197952" cy="6858000"/>
+            <a:off x="-1" y="1168400"/>
+            <a:ext cx="12166781" cy="5689600"/>
           </a:xfrm>
           <a:prstGeom prst="rect">
             <a:avLst/>
@@ -3054,7 +3326,7 @@
     </p:spTree>
     <p:extLst>
       <p:ext uri="{BB962C8B-B14F-4D97-AF65-F5344CB8AC3E}">
-        <p14:creationId xmlns:p14="http://schemas.microsoft.com/office/powerpoint/2010/main" val="1048569049"/>
+        <p14:creationId xmlns:p14="http://schemas.microsoft.com/office/powerpoint/2010/main" val="2590118571"/>
       </p:ext>
     </p:extLst>
   </p:cSld>
@@ -3083,7 +3355,7 @@
       </p:grpSpPr>
       <p:pic>
         <p:nvPicPr>
-          <p:cNvPr id="4" name="Picture 3"/>
+          <p:cNvPr id="2" name="Picture 1"/>
           <p:cNvPicPr>
             <a:picLocks noChangeAspect="1"/>
           </p:cNvPicPr>
@@ -3091,13 +3363,13 @@
         </p:nvPicPr>
         <p:blipFill rotWithShape="1">
           <a:blip r:embed="rId2"/>
-          <a:srcRect t="11201" r="16764" b="5564"/>
+          <a:srcRect l="1" t="11260" r="1252" b="5605"/>
           <a:stretch/>
         </p:blipFill>
         <p:spPr>
           <a:xfrm>
-            <a:off x="0" y="0"/>
-            <a:ext cx="12020550" cy="6758260"/>
+            <a:off x="0" y="551544"/>
+            <a:ext cx="12051046" cy="5704113"/>
           </a:xfrm>
           <a:prstGeom prst="rect">
             <a:avLst/>
@@ -3107,7 +3379,7 @@
     </p:spTree>
     <p:extLst>
       <p:ext uri="{BB962C8B-B14F-4D97-AF65-F5344CB8AC3E}">
-        <p14:creationId xmlns:p14="http://schemas.microsoft.com/office/powerpoint/2010/main" val="2641250053"/>
+        <p14:creationId xmlns:p14="http://schemas.microsoft.com/office/powerpoint/2010/main" val="1130772529"/>
       </p:ext>
     </p:extLst>
   </p:cSld>
@@ -3136,7 +3408,7 @@
       </p:grpSpPr>
       <p:pic>
         <p:nvPicPr>
-          <p:cNvPr id="4" name="Picture 3"/>
+          <p:cNvPr id="2" name="Picture 1"/>
           <p:cNvPicPr>
             <a:picLocks noChangeAspect="1"/>
           </p:cNvPicPr>
@@ -3144,13 +3416,13 @@
         </p:nvPicPr>
         <p:blipFill rotWithShape="1">
           <a:blip r:embed="rId2"/>
-          <a:srcRect t="11201" r="16912" b="5710"/>
+          <a:srcRect l="1" t="11458" r="1140" b="5804"/>
           <a:stretch/>
         </p:blipFill>
         <p:spPr>
           <a:xfrm>
-            <a:off x="0" y="0"/>
-            <a:ext cx="12197952" cy="6858000"/>
+            <a:off x="261258" y="740230"/>
+            <a:ext cx="11292114" cy="5313374"/>
           </a:xfrm>
           <a:prstGeom prst="rect">
             <a:avLst/>
@@ -3160,7 +3432,7 @@
     </p:spTree>
     <p:extLst>
       <p:ext uri="{BB962C8B-B14F-4D97-AF65-F5344CB8AC3E}">
-        <p14:creationId xmlns:p14="http://schemas.microsoft.com/office/powerpoint/2010/main" val="2734631531"/>
+        <p14:creationId xmlns:p14="http://schemas.microsoft.com/office/powerpoint/2010/main" val="225503757"/>
       </p:ext>
     </p:extLst>
   </p:cSld>
@@ -3189,7 +3461,7 @@
       </p:grpSpPr>
       <p:pic>
         <p:nvPicPr>
-          <p:cNvPr id="4" name="Picture 3"/>
+          <p:cNvPr id="2" name="Picture 1"/>
           <p:cNvPicPr>
             <a:picLocks noChangeAspect="1"/>
           </p:cNvPicPr>
@@ -3197,13 +3469,13 @@
         </p:nvPicPr>
         <p:blipFill rotWithShape="1">
           <a:blip r:embed="rId2"/>
-          <a:srcRect t="11344" r="17203" b="5860"/>
+          <a:srcRect l="1" t="11459" r="1475" b="5407"/>
           <a:stretch/>
         </p:blipFill>
         <p:spPr>
           <a:xfrm>
-            <a:off x="0" y="0"/>
-            <a:ext cx="12197952" cy="6858000"/>
+            <a:off x="838654" y="856342"/>
+            <a:ext cx="10616452" cy="5036457"/>
           </a:xfrm>
           <a:prstGeom prst="rect">
             <a:avLst/>
@@ -3213,7 +3485,7 @@
     </p:spTree>
     <p:extLst>
       <p:ext uri="{BB962C8B-B14F-4D97-AF65-F5344CB8AC3E}">
-        <p14:creationId xmlns:p14="http://schemas.microsoft.com/office/powerpoint/2010/main" val="391174454"/>
+        <p14:creationId xmlns:p14="http://schemas.microsoft.com/office/powerpoint/2010/main" val="3646964340"/>
       </p:ext>
     </p:extLst>
   </p:cSld>
@@ -3242,7 +3514,7 @@
       </p:grpSpPr>
       <p:pic>
         <p:nvPicPr>
-          <p:cNvPr id="4" name="Picture 3"/>
+          <p:cNvPr id="2" name="Picture 1"/>
           <p:cNvPicPr>
             <a:picLocks noChangeAspect="1"/>
           </p:cNvPicPr>
@@ -3250,13 +3522,13 @@
         </p:nvPicPr>
         <p:blipFill rotWithShape="1">
           <a:blip r:embed="rId2"/>
-          <a:srcRect l="-1" t="11718" r="16617" b="4899"/>
+          <a:srcRect t="11527" r="1363" b="6002"/>
           <a:stretch/>
         </p:blipFill>
         <p:spPr>
           <a:xfrm>
-            <a:off x="0" y="0"/>
-            <a:ext cx="12197953" cy="6858000"/>
+            <a:off x="101598" y="653143"/>
+            <a:ext cx="11979917" cy="5631542"/>
           </a:xfrm>
           <a:prstGeom prst="rect">
             <a:avLst/>
@@ -3266,7 +3538,7 @@
     </p:spTree>
     <p:extLst>
       <p:ext uri="{BB962C8B-B14F-4D97-AF65-F5344CB8AC3E}">
-        <p14:creationId xmlns:p14="http://schemas.microsoft.com/office/powerpoint/2010/main" val="2803120891"/>
+        <p14:creationId xmlns:p14="http://schemas.microsoft.com/office/powerpoint/2010/main" val="3421090950"/>
       </p:ext>
     </p:extLst>
   </p:cSld>
@@ -3295,7 +3567,7 @@
       </p:grpSpPr>
       <p:pic>
         <p:nvPicPr>
-          <p:cNvPr id="4" name="Picture 3"/>
+          <p:cNvPr id="2" name="Picture 1"/>
           <p:cNvPicPr>
             <a:picLocks noChangeAspect="1"/>
           </p:cNvPicPr>
@@ -3303,13 +3575,13 @@
         </p:nvPicPr>
         <p:blipFill rotWithShape="1">
           <a:blip r:embed="rId2"/>
-          <a:srcRect t="10908" r="16472" b="5564"/>
+          <a:srcRect t="11458" r="1363" b="5804"/>
           <a:stretch/>
         </p:blipFill>
         <p:spPr>
           <a:xfrm>
-            <a:off x="0" y="0"/>
-            <a:ext cx="12197952" cy="6858000"/>
+            <a:off x="446768" y="783773"/>
+            <a:ext cx="11633520" cy="5486400"/>
           </a:xfrm>
           <a:prstGeom prst="rect">
             <a:avLst/>
@@ -3319,7 +3591,113 @@
     </p:spTree>
     <p:extLst>
       <p:ext uri="{BB962C8B-B14F-4D97-AF65-F5344CB8AC3E}">
-        <p14:creationId xmlns:p14="http://schemas.microsoft.com/office/powerpoint/2010/main" val="1379568419"/>
+        <p14:creationId xmlns:p14="http://schemas.microsoft.com/office/powerpoint/2010/main" val="1093371343"/>
+      </p:ext>
+    </p:extLst>
+  </p:cSld>
+  <p:clrMapOvr>
+    <a:masterClrMapping/>
+  </p:clrMapOvr>
+</p:sld>
+</file>
+
+<file path=ppt/slides/slide8.xml><?xml version="1.0" encoding="utf-8"?>
+<p:sld xmlns:a="http://schemas.openxmlformats.org/drawingml/2006/main" xmlns:r="http://schemas.openxmlformats.org/officeDocument/2006/relationships" xmlns:p="http://schemas.openxmlformats.org/presentationml/2006/main">
+  <p:cSld>
+    <p:spTree>
+      <p:nvGrpSpPr>
+        <p:cNvPr id="1" name=""/>
+        <p:cNvGrpSpPr/>
+        <p:nvPr/>
+      </p:nvGrpSpPr>
+      <p:grpSpPr>
+        <a:xfrm>
+          <a:off x="0" y="0"/>
+          <a:ext cx="0" cy="0"/>
+          <a:chOff x="0" y="0"/>
+          <a:chExt cx="0" cy="0"/>
+        </a:xfrm>
+      </p:grpSpPr>
+      <p:pic>
+        <p:nvPicPr>
+          <p:cNvPr id="4" name="Picture 3"/>
+          <p:cNvPicPr>
+            <a:picLocks noChangeAspect="1"/>
+          </p:cNvPicPr>
+          <p:nvPr/>
+        </p:nvPicPr>
+        <p:blipFill rotWithShape="1">
+          <a:blip r:embed="rId2"/>
+          <a:srcRect l="1" t="11061" r="1921" b="5804"/>
+          <a:stretch/>
+        </p:blipFill>
+        <p:spPr>
+          <a:xfrm>
+            <a:off x="867681" y="885371"/>
+            <a:ext cx="10526033" cy="5016280"/>
+          </a:xfrm>
+          <a:prstGeom prst="rect">
+            <a:avLst/>
+          </a:prstGeom>
+        </p:spPr>
+      </p:pic>
+    </p:spTree>
+    <p:extLst>
+      <p:ext uri="{BB962C8B-B14F-4D97-AF65-F5344CB8AC3E}">
+        <p14:creationId xmlns:p14="http://schemas.microsoft.com/office/powerpoint/2010/main" val="3234399692"/>
+      </p:ext>
+    </p:extLst>
+  </p:cSld>
+  <p:clrMapOvr>
+    <a:masterClrMapping/>
+  </p:clrMapOvr>
+</p:sld>
+</file>
+
+<file path=ppt/slides/slide9.xml><?xml version="1.0" encoding="utf-8"?>
+<p:sld xmlns:a="http://schemas.openxmlformats.org/drawingml/2006/main" xmlns:r="http://schemas.openxmlformats.org/officeDocument/2006/relationships" xmlns:p="http://schemas.openxmlformats.org/presentationml/2006/main">
+  <p:cSld>
+    <p:spTree>
+      <p:nvGrpSpPr>
+        <p:cNvPr id="1" name=""/>
+        <p:cNvGrpSpPr/>
+        <p:nvPr/>
+      </p:nvGrpSpPr>
+      <p:grpSpPr>
+        <a:xfrm>
+          <a:off x="0" y="0"/>
+          <a:ext cx="0" cy="0"/>
+          <a:chOff x="0" y="0"/>
+          <a:chExt cx="0" cy="0"/>
+        </a:xfrm>
+      </p:grpSpPr>
+      <p:pic>
+        <p:nvPicPr>
+          <p:cNvPr id="2" name="Picture 1"/>
+          <p:cNvPicPr>
+            <a:picLocks noChangeAspect="1"/>
+          </p:cNvPicPr>
+          <p:nvPr/>
+        </p:nvPicPr>
+        <p:blipFill rotWithShape="1">
+          <a:blip r:embed="rId2"/>
+          <a:srcRect t="11490" r="1586" b="6399"/>
+          <a:stretch/>
+        </p:blipFill>
+        <p:spPr>
+          <a:xfrm>
+            <a:off x="185511" y="653142"/>
+            <a:ext cx="11881352" cy="5573485"/>
+          </a:xfrm>
+          <a:prstGeom prst="rect">
+            <a:avLst/>
+          </a:prstGeom>
+        </p:spPr>
+      </p:pic>
+    </p:spTree>
+    <p:extLst>
+      <p:ext uri="{BB962C8B-B14F-4D97-AF65-F5344CB8AC3E}">
+        <p14:creationId xmlns:p14="http://schemas.microsoft.com/office/powerpoint/2010/main" val="2131900107"/>
       </p:ext>
     </p:extLst>
   </p:cSld>

</xml_diff>